<commit_message>
Revised versions of the problem description
mrf-v1.pptx contains drawings that I included in the word file.
</commit_message>
<xml_diff>
--- a/problem_statement/mrf-v1.pptx
+++ b/problem_statement/mrf-v1.pptx
@@ -7,6 +7,7 @@
   <p:sldIdLst>
     <p:sldId id="256" r:id="rId2"/>
     <p:sldId id="257" r:id="rId3"/>
+    <p:sldId id="258" r:id="rId4"/>
   </p:sldIdLst>
   <p:sldSz cx="9144000" cy="6858000" type="screen4x3"/>
   <p:notesSz cx="6858000" cy="9144000"/>
@@ -3124,8 +3125,8 @@
               <a:chExt cx="2128914" cy="914400"/>
             </a:xfrm>
           </p:grpSpPr>
-          <mc:AlternateContent xmlns:mc="http://schemas.openxmlformats.org/markup-compatibility/2006">
-            <mc:Choice xmlns:a14="http://schemas.microsoft.com/office/drawing/2010/main" Requires="a14">
+          <mc:AlternateContent xmlns:mc="http://schemas.openxmlformats.org/markup-compatibility/2006" xmlns:a14="http://schemas.microsoft.com/office/drawing/2010/main">
+            <mc:Choice Requires="a14">
               <p:sp>
                 <p:nvSpPr>
                   <p:cNvPr id="22" name="Parallelogram 21"/>
@@ -3203,7 +3204,7 @@
                 </p:txBody>
               </p:sp>
             </mc:Choice>
-            <mc:Fallback>
+            <mc:Fallback xmlns="">
               <p:sp>
                 <p:nvSpPr>
                   <p:cNvPr id="22" name="Parallelogram 21"/>
@@ -3244,8 +3245,8 @@
               </p:sp>
             </mc:Fallback>
           </mc:AlternateContent>
-          <mc:AlternateContent xmlns:mc="http://schemas.openxmlformats.org/markup-compatibility/2006">
-            <mc:Choice xmlns:a14="http://schemas.microsoft.com/office/drawing/2010/main" Requires="a14">
+          <mc:AlternateContent xmlns:mc="http://schemas.openxmlformats.org/markup-compatibility/2006" xmlns:a14="http://schemas.microsoft.com/office/drawing/2010/main">
+            <mc:Choice Requires="a14">
               <p:sp>
                 <p:nvSpPr>
                   <p:cNvPr id="23" name="Parallelogram 22"/>
@@ -3323,7 +3324,7 @@
                 </p:txBody>
               </p:sp>
             </mc:Choice>
-            <mc:Fallback>
+            <mc:Fallback xmlns="">
               <p:sp>
                 <p:nvSpPr>
                   <p:cNvPr id="23" name="Parallelogram 22"/>
@@ -3364,8 +3365,8 @@
               </p:sp>
             </mc:Fallback>
           </mc:AlternateContent>
-          <mc:AlternateContent xmlns:mc="http://schemas.openxmlformats.org/markup-compatibility/2006">
-            <mc:Choice xmlns:a14="http://schemas.microsoft.com/office/drawing/2010/main" Requires="a14">
+          <mc:AlternateContent xmlns:mc="http://schemas.openxmlformats.org/markup-compatibility/2006" xmlns:a14="http://schemas.microsoft.com/office/drawing/2010/main">
+            <mc:Choice Requires="a14">
               <p:sp>
                 <p:nvSpPr>
                   <p:cNvPr id="24" name="Parallelogram 23"/>
@@ -3443,7 +3444,7 @@
                 </p:txBody>
               </p:sp>
             </mc:Choice>
-            <mc:Fallback>
+            <mc:Fallback xmlns="">
               <p:sp>
                 <p:nvSpPr>
                   <p:cNvPr id="24" name="Parallelogram 23"/>
@@ -3484,8 +3485,8 @@
               </p:sp>
             </mc:Fallback>
           </mc:AlternateContent>
-          <mc:AlternateContent xmlns:mc="http://schemas.openxmlformats.org/markup-compatibility/2006">
-            <mc:Choice xmlns:a14="http://schemas.microsoft.com/office/drawing/2010/main" Requires="a14">
+          <mc:AlternateContent xmlns:mc="http://schemas.openxmlformats.org/markup-compatibility/2006" xmlns:a14="http://schemas.microsoft.com/office/drawing/2010/main">
+            <mc:Choice Requires="a14">
               <p:sp>
                 <p:nvSpPr>
                   <p:cNvPr id="25" name="Parallelogram 24"/>
@@ -3563,7 +3564,7 @@
                 </p:txBody>
               </p:sp>
             </mc:Choice>
-            <mc:Fallback>
+            <mc:Fallback xmlns="">
               <p:sp>
                 <p:nvSpPr>
                   <p:cNvPr id="25" name="Parallelogram 24"/>
@@ -3604,8 +3605,8 @@
               </p:sp>
             </mc:Fallback>
           </mc:AlternateContent>
-          <mc:AlternateContent xmlns:mc="http://schemas.openxmlformats.org/markup-compatibility/2006">
-            <mc:Choice xmlns:a14="http://schemas.microsoft.com/office/drawing/2010/main" Requires="a14">
+          <mc:AlternateContent xmlns:mc="http://schemas.openxmlformats.org/markup-compatibility/2006" xmlns:a14="http://schemas.microsoft.com/office/drawing/2010/main">
+            <mc:Choice Requires="a14">
               <p:sp>
                 <p:nvSpPr>
                   <p:cNvPr id="26" name="Parallelogram 25"/>
@@ -3683,7 +3684,7 @@
                 </p:txBody>
               </p:sp>
             </mc:Choice>
-            <mc:Fallback>
+            <mc:Fallback xmlns="">
               <p:sp>
                 <p:nvSpPr>
                   <p:cNvPr id="26" name="Parallelogram 25"/>
@@ -3724,8 +3725,8 @@
               </p:sp>
             </mc:Fallback>
           </mc:AlternateContent>
-          <mc:AlternateContent xmlns:mc="http://schemas.openxmlformats.org/markup-compatibility/2006">
-            <mc:Choice xmlns:a14="http://schemas.microsoft.com/office/drawing/2010/main" Requires="a14">
+          <mc:AlternateContent xmlns:mc="http://schemas.openxmlformats.org/markup-compatibility/2006" xmlns:a14="http://schemas.microsoft.com/office/drawing/2010/main">
+            <mc:Choice Requires="a14">
               <p:sp>
                 <p:nvSpPr>
                   <p:cNvPr id="27" name="Parallelogram 26"/>
@@ -3803,7 +3804,7 @@
                 </p:txBody>
               </p:sp>
             </mc:Choice>
-            <mc:Fallback>
+            <mc:Fallback xmlns="">
               <p:sp>
                 <p:nvSpPr>
                   <p:cNvPr id="27" name="Parallelogram 26"/>
@@ -3844,8 +3845,8 @@
               </p:sp>
             </mc:Fallback>
           </mc:AlternateContent>
-          <mc:AlternateContent xmlns:mc="http://schemas.openxmlformats.org/markup-compatibility/2006">
-            <mc:Choice xmlns:a14="http://schemas.microsoft.com/office/drawing/2010/main" Requires="a14">
+          <mc:AlternateContent xmlns:mc="http://schemas.openxmlformats.org/markup-compatibility/2006" xmlns:a14="http://schemas.microsoft.com/office/drawing/2010/main">
+            <mc:Choice Requires="a14">
               <p:sp>
                 <p:nvSpPr>
                   <p:cNvPr id="28" name="Parallelogram 27"/>
@@ -3923,7 +3924,7 @@
                 </p:txBody>
               </p:sp>
             </mc:Choice>
-            <mc:Fallback>
+            <mc:Fallback xmlns="">
               <p:sp>
                 <p:nvSpPr>
                   <p:cNvPr id="28" name="Parallelogram 27"/>
@@ -3964,8 +3965,8 @@
               </p:sp>
             </mc:Fallback>
           </mc:AlternateContent>
-          <mc:AlternateContent xmlns:mc="http://schemas.openxmlformats.org/markup-compatibility/2006">
-            <mc:Choice xmlns:a14="http://schemas.microsoft.com/office/drawing/2010/main" Requires="a14">
+          <mc:AlternateContent xmlns:mc="http://schemas.openxmlformats.org/markup-compatibility/2006" xmlns:a14="http://schemas.microsoft.com/office/drawing/2010/main">
+            <mc:Choice Requires="a14">
               <p:sp>
                 <p:nvSpPr>
                   <p:cNvPr id="29" name="Parallelogram 28"/>
@@ -4043,7 +4044,7 @@
                 </p:txBody>
               </p:sp>
             </mc:Choice>
-            <mc:Fallback>
+            <mc:Fallback xmlns="">
               <p:sp>
                 <p:nvSpPr>
                   <p:cNvPr id="29" name="Parallelogram 28"/>
@@ -4084,8 +4085,8 @@
               </p:sp>
             </mc:Fallback>
           </mc:AlternateContent>
-          <mc:AlternateContent xmlns:mc="http://schemas.openxmlformats.org/markup-compatibility/2006">
-            <mc:Choice xmlns:a14="http://schemas.microsoft.com/office/drawing/2010/main" Requires="a14">
+          <mc:AlternateContent xmlns:mc="http://schemas.openxmlformats.org/markup-compatibility/2006" xmlns:a14="http://schemas.microsoft.com/office/drawing/2010/main">
+            <mc:Choice Requires="a14">
               <p:sp>
                 <p:nvSpPr>
                   <p:cNvPr id="30" name="Parallelogram 29"/>
@@ -4163,7 +4164,7 @@
                 </p:txBody>
               </p:sp>
             </mc:Choice>
-            <mc:Fallback>
+            <mc:Fallback xmlns="">
               <p:sp>
                 <p:nvSpPr>
                   <p:cNvPr id="30" name="Parallelogram 29"/>
@@ -4219,8 +4220,8 @@
               <a:chExt cx="2144816" cy="914400"/>
             </a:xfrm>
           </p:grpSpPr>
-          <mc:AlternateContent xmlns:mc="http://schemas.openxmlformats.org/markup-compatibility/2006">
-            <mc:Choice xmlns:a14="http://schemas.microsoft.com/office/drawing/2010/main" Requires="a14">
+          <mc:AlternateContent xmlns:mc="http://schemas.openxmlformats.org/markup-compatibility/2006" xmlns:a14="http://schemas.microsoft.com/office/drawing/2010/main">
+            <mc:Choice Requires="a14">
               <p:sp>
                 <p:nvSpPr>
                   <p:cNvPr id="4" name="Parallelogram 3"/>
@@ -4304,7 +4305,7 @@
                 </p:txBody>
               </p:sp>
             </mc:Choice>
-            <mc:Fallback>
+            <mc:Fallback xmlns="">
               <p:sp>
                 <p:nvSpPr>
                   <p:cNvPr id="4" name="Parallelogram 3"/>
@@ -4345,8 +4346,8 @@
               </p:sp>
             </mc:Fallback>
           </mc:AlternateContent>
-          <mc:AlternateContent xmlns:mc="http://schemas.openxmlformats.org/markup-compatibility/2006">
-            <mc:Choice xmlns:a14="http://schemas.microsoft.com/office/drawing/2010/main" Requires="a14">
+          <mc:AlternateContent xmlns:mc="http://schemas.openxmlformats.org/markup-compatibility/2006" xmlns:a14="http://schemas.microsoft.com/office/drawing/2010/main">
+            <mc:Choice Requires="a14">
               <p:sp>
                 <p:nvSpPr>
                   <p:cNvPr id="5" name="Parallelogram 4"/>
@@ -4430,7 +4431,7 @@
                 </p:txBody>
               </p:sp>
             </mc:Choice>
-            <mc:Fallback>
+            <mc:Fallback xmlns="">
               <p:sp>
                 <p:nvSpPr>
                   <p:cNvPr id="5" name="Parallelogram 4"/>
@@ -4471,8 +4472,8 @@
               </p:sp>
             </mc:Fallback>
           </mc:AlternateContent>
-          <mc:AlternateContent xmlns:mc="http://schemas.openxmlformats.org/markup-compatibility/2006">
-            <mc:Choice xmlns:a14="http://schemas.microsoft.com/office/drawing/2010/main" Requires="a14">
+          <mc:AlternateContent xmlns:mc="http://schemas.openxmlformats.org/markup-compatibility/2006" xmlns:a14="http://schemas.microsoft.com/office/drawing/2010/main">
+            <mc:Choice Requires="a14">
               <p:sp>
                 <p:nvSpPr>
                   <p:cNvPr id="6" name="Parallelogram 5"/>
@@ -4556,7 +4557,7 @@
                 </p:txBody>
               </p:sp>
             </mc:Choice>
-            <mc:Fallback>
+            <mc:Fallback xmlns="">
               <p:sp>
                 <p:nvSpPr>
                   <p:cNvPr id="6" name="Parallelogram 5"/>
@@ -4597,8 +4598,8 @@
               </p:sp>
             </mc:Fallback>
           </mc:AlternateContent>
-          <mc:AlternateContent xmlns:mc="http://schemas.openxmlformats.org/markup-compatibility/2006">
-            <mc:Choice xmlns:a14="http://schemas.microsoft.com/office/drawing/2010/main" Requires="a14">
+          <mc:AlternateContent xmlns:mc="http://schemas.openxmlformats.org/markup-compatibility/2006" xmlns:a14="http://schemas.microsoft.com/office/drawing/2010/main">
+            <mc:Choice Requires="a14">
               <p:sp>
                 <p:nvSpPr>
                   <p:cNvPr id="7" name="Parallelogram 6"/>
@@ -4682,7 +4683,7 @@
                 </p:txBody>
               </p:sp>
             </mc:Choice>
-            <mc:Fallback>
+            <mc:Fallback xmlns="">
               <p:sp>
                 <p:nvSpPr>
                   <p:cNvPr id="7" name="Parallelogram 6"/>
@@ -4723,8 +4724,8 @@
               </p:sp>
             </mc:Fallback>
           </mc:AlternateContent>
-          <mc:AlternateContent xmlns:mc="http://schemas.openxmlformats.org/markup-compatibility/2006">
-            <mc:Choice xmlns:a14="http://schemas.microsoft.com/office/drawing/2010/main" Requires="a14">
+          <mc:AlternateContent xmlns:mc="http://schemas.openxmlformats.org/markup-compatibility/2006" xmlns:a14="http://schemas.microsoft.com/office/drawing/2010/main">
+            <mc:Choice Requires="a14">
               <p:sp>
                 <p:nvSpPr>
                   <p:cNvPr id="8" name="Parallelogram 7"/>
@@ -4808,7 +4809,7 @@
                 </p:txBody>
               </p:sp>
             </mc:Choice>
-            <mc:Fallback>
+            <mc:Fallback xmlns="">
               <p:sp>
                 <p:nvSpPr>
                   <p:cNvPr id="8" name="Parallelogram 7"/>
@@ -4849,8 +4850,8 @@
               </p:sp>
             </mc:Fallback>
           </mc:AlternateContent>
-          <mc:AlternateContent xmlns:mc="http://schemas.openxmlformats.org/markup-compatibility/2006">
-            <mc:Choice xmlns:a14="http://schemas.microsoft.com/office/drawing/2010/main" Requires="a14">
+          <mc:AlternateContent xmlns:mc="http://schemas.openxmlformats.org/markup-compatibility/2006" xmlns:a14="http://schemas.microsoft.com/office/drawing/2010/main">
+            <mc:Choice Requires="a14">
               <p:sp>
                 <p:nvSpPr>
                   <p:cNvPr id="10" name="Parallelogram 9"/>
@@ -4934,7 +4935,7 @@
                 </p:txBody>
               </p:sp>
             </mc:Choice>
-            <mc:Fallback>
+            <mc:Fallback xmlns="">
               <p:sp>
                 <p:nvSpPr>
                   <p:cNvPr id="10" name="Parallelogram 9"/>
@@ -4975,8 +4976,8 @@
               </p:sp>
             </mc:Fallback>
           </mc:AlternateContent>
-          <mc:AlternateContent xmlns:mc="http://schemas.openxmlformats.org/markup-compatibility/2006">
-            <mc:Choice xmlns:a14="http://schemas.microsoft.com/office/drawing/2010/main" Requires="a14">
+          <mc:AlternateContent xmlns:mc="http://schemas.openxmlformats.org/markup-compatibility/2006" xmlns:a14="http://schemas.microsoft.com/office/drawing/2010/main">
+            <mc:Choice Requires="a14">
               <p:sp>
                 <p:nvSpPr>
                   <p:cNvPr id="12" name="Parallelogram 11"/>
@@ -5060,7 +5061,7 @@
                 </p:txBody>
               </p:sp>
             </mc:Choice>
-            <mc:Fallback>
+            <mc:Fallback xmlns="">
               <p:sp>
                 <p:nvSpPr>
                   <p:cNvPr id="12" name="Parallelogram 11"/>
@@ -5101,8 +5102,8 @@
               </p:sp>
             </mc:Fallback>
           </mc:AlternateContent>
-          <mc:AlternateContent xmlns:mc="http://schemas.openxmlformats.org/markup-compatibility/2006">
-            <mc:Choice xmlns:a14="http://schemas.microsoft.com/office/drawing/2010/main" Requires="a14">
+          <mc:AlternateContent xmlns:mc="http://schemas.openxmlformats.org/markup-compatibility/2006" xmlns:a14="http://schemas.microsoft.com/office/drawing/2010/main">
+            <mc:Choice Requires="a14">
               <p:sp>
                 <p:nvSpPr>
                   <p:cNvPr id="13" name="Parallelogram 12"/>
@@ -5186,7 +5187,7 @@
                 </p:txBody>
               </p:sp>
             </mc:Choice>
-            <mc:Fallback>
+            <mc:Fallback xmlns="">
               <p:sp>
                 <p:nvSpPr>
                   <p:cNvPr id="13" name="Parallelogram 12"/>
@@ -5227,8 +5228,8 @@
               </p:sp>
             </mc:Fallback>
           </mc:AlternateContent>
-          <mc:AlternateContent xmlns:mc="http://schemas.openxmlformats.org/markup-compatibility/2006">
-            <mc:Choice xmlns:a14="http://schemas.microsoft.com/office/drawing/2010/main" Requires="a14">
+          <mc:AlternateContent xmlns:mc="http://schemas.openxmlformats.org/markup-compatibility/2006" xmlns:a14="http://schemas.microsoft.com/office/drawing/2010/main">
+            <mc:Choice Requires="a14">
               <p:sp>
                 <p:nvSpPr>
                   <p:cNvPr id="16" name="Parallelogram 15"/>
@@ -5312,7 +5313,7 @@
                 </p:txBody>
               </p:sp>
             </mc:Choice>
-            <mc:Fallback>
+            <mc:Fallback xmlns="">
               <p:sp>
                 <p:nvSpPr>
                   <p:cNvPr id="16" name="Parallelogram 15"/>
@@ -5368,8 +5369,8 @@
               <a:chExt cx="2144816" cy="914400"/>
             </a:xfrm>
           </p:grpSpPr>
-          <mc:AlternateContent xmlns:mc="http://schemas.openxmlformats.org/markup-compatibility/2006">
-            <mc:Choice xmlns:a14="http://schemas.microsoft.com/office/drawing/2010/main" Requires="a14">
+          <mc:AlternateContent xmlns:mc="http://schemas.openxmlformats.org/markup-compatibility/2006" xmlns:a14="http://schemas.microsoft.com/office/drawing/2010/main">
+            <mc:Choice Requires="a14">
               <p:sp>
                 <p:nvSpPr>
                   <p:cNvPr id="32" name="Parallelogram 31"/>
@@ -5447,7 +5448,7 @@
                 </p:txBody>
               </p:sp>
             </mc:Choice>
-            <mc:Fallback>
+            <mc:Fallback xmlns="">
               <p:sp>
                 <p:nvSpPr>
                   <p:cNvPr id="32" name="Parallelogram 31"/>
@@ -5488,8 +5489,8 @@
               </p:sp>
             </mc:Fallback>
           </mc:AlternateContent>
-          <mc:AlternateContent xmlns:mc="http://schemas.openxmlformats.org/markup-compatibility/2006">
-            <mc:Choice xmlns:a14="http://schemas.microsoft.com/office/drawing/2010/main" Requires="a14">
+          <mc:AlternateContent xmlns:mc="http://schemas.openxmlformats.org/markup-compatibility/2006" xmlns:a14="http://schemas.microsoft.com/office/drawing/2010/main">
+            <mc:Choice Requires="a14">
               <p:sp>
                 <p:nvSpPr>
                   <p:cNvPr id="33" name="Parallelogram 32"/>
@@ -5567,7 +5568,7 @@
                 </p:txBody>
               </p:sp>
             </mc:Choice>
-            <mc:Fallback>
+            <mc:Fallback xmlns="">
               <p:sp>
                 <p:nvSpPr>
                   <p:cNvPr id="33" name="Parallelogram 32"/>
@@ -5608,8 +5609,8 @@
               </p:sp>
             </mc:Fallback>
           </mc:AlternateContent>
-          <mc:AlternateContent xmlns:mc="http://schemas.openxmlformats.org/markup-compatibility/2006">
-            <mc:Choice xmlns:a14="http://schemas.microsoft.com/office/drawing/2010/main" Requires="a14">
+          <mc:AlternateContent xmlns:mc="http://schemas.openxmlformats.org/markup-compatibility/2006" xmlns:a14="http://schemas.microsoft.com/office/drawing/2010/main">
+            <mc:Choice Requires="a14">
               <p:sp>
                 <p:nvSpPr>
                   <p:cNvPr id="34" name="Parallelogram 33"/>
@@ -5687,7 +5688,7 @@
                 </p:txBody>
               </p:sp>
             </mc:Choice>
-            <mc:Fallback>
+            <mc:Fallback xmlns="">
               <p:sp>
                 <p:nvSpPr>
                   <p:cNvPr id="34" name="Parallelogram 33"/>
@@ -5728,8 +5729,8 @@
               </p:sp>
             </mc:Fallback>
           </mc:AlternateContent>
-          <mc:AlternateContent xmlns:mc="http://schemas.openxmlformats.org/markup-compatibility/2006">
-            <mc:Choice xmlns:a14="http://schemas.microsoft.com/office/drawing/2010/main" Requires="a14">
+          <mc:AlternateContent xmlns:mc="http://schemas.openxmlformats.org/markup-compatibility/2006" xmlns:a14="http://schemas.microsoft.com/office/drawing/2010/main">
+            <mc:Choice Requires="a14">
               <p:sp>
                 <p:nvSpPr>
                   <p:cNvPr id="35" name="Parallelogram 34"/>
@@ -5807,7 +5808,7 @@
                 </p:txBody>
               </p:sp>
             </mc:Choice>
-            <mc:Fallback>
+            <mc:Fallback xmlns="">
               <p:sp>
                 <p:nvSpPr>
                   <p:cNvPr id="35" name="Parallelogram 34"/>
@@ -5848,8 +5849,8 @@
               </p:sp>
             </mc:Fallback>
           </mc:AlternateContent>
-          <mc:AlternateContent xmlns:mc="http://schemas.openxmlformats.org/markup-compatibility/2006">
-            <mc:Choice xmlns:a14="http://schemas.microsoft.com/office/drawing/2010/main" Requires="a14">
+          <mc:AlternateContent xmlns:mc="http://schemas.openxmlformats.org/markup-compatibility/2006" xmlns:a14="http://schemas.microsoft.com/office/drawing/2010/main">
+            <mc:Choice Requires="a14">
               <p:sp>
                 <p:nvSpPr>
                   <p:cNvPr id="36" name="Parallelogram 35"/>
@@ -5927,7 +5928,7 @@
                 </p:txBody>
               </p:sp>
             </mc:Choice>
-            <mc:Fallback>
+            <mc:Fallback xmlns="">
               <p:sp>
                 <p:nvSpPr>
                   <p:cNvPr id="36" name="Parallelogram 35"/>
@@ -5968,8 +5969,8 @@
               </p:sp>
             </mc:Fallback>
           </mc:AlternateContent>
-          <mc:AlternateContent xmlns:mc="http://schemas.openxmlformats.org/markup-compatibility/2006">
-            <mc:Choice xmlns:a14="http://schemas.microsoft.com/office/drawing/2010/main" Requires="a14">
+          <mc:AlternateContent xmlns:mc="http://schemas.openxmlformats.org/markup-compatibility/2006" xmlns:a14="http://schemas.microsoft.com/office/drawing/2010/main">
+            <mc:Choice Requires="a14">
               <p:sp>
                 <p:nvSpPr>
                   <p:cNvPr id="37" name="Parallelogram 36"/>
@@ -6047,7 +6048,7 @@
                 </p:txBody>
               </p:sp>
             </mc:Choice>
-            <mc:Fallback>
+            <mc:Fallback xmlns="">
               <p:sp>
                 <p:nvSpPr>
                   <p:cNvPr id="37" name="Parallelogram 36"/>
@@ -6088,8 +6089,8 @@
               </p:sp>
             </mc:Fallback>
           </mc:AlternateContent>
-          <mc:AlternateContent xmlns:mc="http://schemas.openxmlformats.org/markup-compatibility/2006">
-            <mc:Choice xmlns:a14="http://schemas.microsoft.com/office/drawing/2010/main" Requires="a14">
+          <mc:AlternateContent xmlns:mc="http://schemas.openxmlformats.org/markup-compatibility/2006" xmlns:a14="http://schemas.microsoft.com/office/drawing/2010/main">
+            <mc:Choice Requires="a14">
               <p:sp>
                 <p:nvSpPr>
                   <p:cNvPr id="38" name="Parallelogram 37"/>
@@ -6167,7 +6168,7 @@
                 </p:txBody>
               </p:sp>
             </mc:Choice>
-            <mc:Fallback>
+            <mc:Fallback xmlns="">
               <p:sp>
                 <p:nvSpPr>
                   <p:cNvPr id="38" name="Parallelogram 37"/>
@@ -6208,8 +6209,8 @@
               </p:sp>
             </mc:Fallback>
           </mc:AlternateContent>
-          <mc:AlternateContent xmlns:mc="http://schemas.openxmlformats.org/markup-compatibility/2006">
-            <mc:Choice xmlns:a14="http://schemas.microsoft.com/office/drawing/2010/main" Requires="a14">
+          <mc:AlternateContent xmlns:mc="http://schemas.openxmlformats.org/markup-compatibility/2006" xmlns:a14="http://schemas.microsoft.com/office/drawing/2010/main">
+            <mc:Choice Requires="a14">
               <p:sp>
                 <p:nvSpPr>
                   <p:cNvPr id="39" name="Parallelogram 38"/>
@@ -6287,7 +6288,7 @@
                 </p:txBody>
               </p:sp>
             </mc:Choice>
-            <mc:Fallback>
+            <mc:Fallback xmlns="">
               <p:sp>
                 <p:nvSpPr>
                   <p:cNvPr id="39" name="Parallelogram 38"/>
@@ -6328,8 +6329,8 @@
               </p:sp>
             </mc:Fallback>
           </mc:AlternateContent>
-          <mc:AlternateContent xmlns:mc="http://schemas.openxmlformats.org/markup-compatibility/2006">
-            <mc:Choice xmlns:a14="http://schemas.microsoft.com/office/drawing/2010/main" Requires="a14">
+          <mc:AlternateContent xmlns:mc="http://schemas.openxmlformats.org/markup-compatibility/2006" xmlns:a14="http://schemas.microsoft.com/office/drawing/2010/main">
+            <mc:Choice Requires="a14">
               <p:sp>
                 <p:nvSpPr>
                   <p:cNvPr id="40" name="Parallelogram 39"/>
@@ -6407,7 +6408,7 @@
                 </p:txBody>
               </p:sp>
             </mc:Choice>
-            <mc:Fallback>
+            <mc:Fallback xmlns="">
               <p:sp>
                 <p:nvSpPr>
                   <p:cNvPr id="40" name="Parallelogram 39"/>
@@ -6777,8 +6778,8 @@
             <a:chExt cx="2203081" cy="1828800"/>
           </a:xfrm>
         </p:grpSpPr>
-        <mc:AlternateContent xmlns:mc="http://schemas.openxmlformats.org/markup-compatibility/2006">
-          <mc:Choice xmlns:a14="http://schemas.microsoft.com/office/drawing/2010/main" Requires="a14">
+        <mc:AlternateContent xmlns:mc="http://schemas.openxmlformats.org/markup-compatibility/2006" xmlns:a14="http://schemas.microsoft.com/office/drawing/2010/main">
+          <mc:Choice Requires="a14">
             <p:sp>
               <p:nvSpPr>
                 <p:cNvPr id="58" name="Parallelogram 57"/>
@@ -6856,7 +6857,7 @@
               </p:txBody>
             </p:sp>
           </mc:Choice>
-          <mc:Fallback>
+          <mc:Fallback xmlns="">
             <p:sp>
               <p:nvSpPr>
                 <p:cNvPr id="58" name="Parallelogram 57"/>
@@ -6897,8 +6898,8 @@
             </p:sp>
           </mc:Fallback>
         </mc:AlternateContent>
-        <mc:AlternateContent xmlns:mc="http://schemas.openxmlformats.org/markup-compatibility/2006">
-          <mc:Choice xmlns:a14="http://schemas.microsoft.com/office/drawing/2010/main" Requires="a14">
+        <mc:AlternateContent xmlns:mc="http://schemas.openxmlformats.org/markup-compatibility/2006" xmlns:a14="http://schemas.microsoft.com/office/drawing/2010/main">
+          <mc:Choice Requires="a14">
             <p:sp>
               <p:nvSpPr>
                 <p:cNvPr id="59" name="Parallelogram 58"/>
@@ -6976,7 +6977,7 @@
               </p:txBody>
             </p:sp>
           </mc:Choice>
-          <mc:Fallback>
+          <mc:Fallback xmlns="">
             <p:sp>
               <p:nvSpPr>
                 <p:cNvPr id="59" name="Parallelogram 58"/>
@@ -7017,8 +7018,8 @@
             </p:sp>
           </mc:Fallback>
         </mc:AlternateContent>
-        <mc:AlternateContent xmlns:mc="http://schemas.openxmlformats.org/markup-compatibility/2006">
-          <mc:Choice xmlns:a14="http://schemas.microsoft.com/office/drawing/2010/main" Requires="a14">
+        <mc:AlternateContent xmlns:mc="http://schemas.openxmlformats.org/markup-compatibility/2006" xmlns:a14="http://schemas.microsoft.com/office/drawing/2010/main">
+          <mc:Choice Requires="a14">
             <p:sp>
               <p:nvSpPr>
                 <p:cNvPr id="60" name="Parallelogram 59"/>
@@ -7096,7 +7097,7 @@
               </p:txBody>
             </p:sp>
           </mc:Choice>
-          <mc:Fallback>
+          <mc:Fallback xmlns="">
             <p:sp>
               <p:nvSpPr>
                 <p:cNvPr id="60" name="Parallelogram 59"/>
@@ -7213,8 +7214,8 @@
             </a:fontRef>
           </p:style>
         </p:cxnSp>
-        <mc:AlternateContent xmlns:mc="http://schemas.openxmlformats.org/markup-compatibility/2006">
-          <mc:Choice xmlns:a14="http://schemas.microsoft.com/office/drawing/2010/main" Requires="a14">
+        <mc:AlternateContent xmlns:mc="http://schemas.openxmlformats.org/markup-compatibility/2006" xmlns:a14="http://schemas.microsoft.com/office/drawing/2010/main">
+          <mc:Choice Requires="a14">
             <p:sp>
               <p:nvSpPr>
                 <p:cNvPr id="65" name="Parallelogram 64"/>
@@ -7292,7 +7293,7 @@
               </p:txBody>
             </p:sp>
           </mc:Choice>
-          <mc:Fallback>
+          <mc:Fallback xmlns="">
             <p:sp>
               <p:nvSpPr>
                 <p:cNvPr id="65" name="Parallelogram 64"/>
@@ -7333,8 +7334,8 @@
             </p:sp>
           </mc:Fallback>
         </mc:AlternateContent>
-        <mc:AlternateContent xmlns:mc="http://schemas.openxmlformats.org/markup-compatibility/2006">
-          <mc:Choice xmlns:a14="http://schemas.microsoft.com/office/drawing/2010/main" Requires="a14">
+        <mc:AlternateContent xmlns:mc="http://schemas.openxmlformats.org/markup-compatibility/2006" xmlns:a14="http://schemas.microsoft.com/office/drawing/2010/main">
+          <mc:Choice Requires="a14">
             <p:sp>
               <p:nvSpPr>
                 <p:cNvPr id="66" name="Parallelogram 65"/>
@@ -7412,7 +7413,7 @@
               </p:txBody>
             </p:sp>
           </mc:Choice>
-          <mc:Fallback>
+          <mc:Fallback xmlns="">
             <p:sp>
               <p:nvSpPr>
                 <p:cNvPr id="66" name="Parallelogram 65"/>
@@ -7453,8 +7454,8 @@
             </p:sp>
           </mc:Fallback>
         </mc:AlternateContent>
-        <mc:AlternateContent xmlns:mc="http://schemas.openxmlformats.org/markup-compatibility/2006">
-          <mc:Choice xmlns:a14="http://schemas.microsoft.com/office/drawing/2010/main" Requires="a14">
+        <mc:AlternateContent xmlns:mc="http://schemas.openxmlformats.org/markup-compatibility/2006" xmlns:a14="http://schemas.microsoft.com/office/drawing/2010/main">
+          <mc:Choice Requires="a14">
             <p:sp>
               <p:nvSpPr>
                 <p:cNvPr id="67" name="Parallelogram 66"/>
@@ -7532,7 +7533,7 @@
               </p:txBody>
             </p:sp>
           </mc:Choice>
-          <mc:Fallback>
+          <mc:Fallback xmlns="">
             <p:sp>
               <p:nvSpPr>
                 <p:cNvPr id="67" name="Parallelogram 66"/>
@@ -7573,8 +7574,8 @@
             </p:sp>
           </mc:Fallback>
         </mc:AlternateContent>
-        <mc:AlternateContent xmlns:mc="http://schemas.openxmlformats.org/markup-compatibility/2006">
-          <mc:Choice xmlns:a14="http://schemas.microsoft.com/office/drawing/2010/main" Requires="a14">
+        <mc:AlternateContent xmlns:mc="http://schemas.openxmlformats.org/markup-compatibility/2006" xmlns:a14="http://schemas.microsoft.com/office/drawing/2010/main">
+          <mc:Choice Requires="a14">
             <p:sp>
               <p:nvSpPr>
                 <p:cNvPr id="68" name="Parallelogram 67"/>
@@ -7652,7 +7653,7 @@
               </p:txBody>
             </p:sp>
           </mc:Choice>
-          <mc:Fallback>
+          <mc:Fallback xmlns="">
             <p:sp>
               <p:nvSpPr>
                 <p:cNvPr id="68" name="Parallelogram 67"/>
@@ -7965,8 +7966,8 @@
             </a:p>
           </p:txBody>
         </p:sp>
-        <mc:AlternateContent xmlns:mc="http://schemas.openxmlformats.org/markup-compatibility/2006">
-          <mc:Choice xmlns:a14="http://schemas.microsoft.com/office/drawing/2010/main" Requires="a14">
+        <mc:AlternateContent xmlns:mc="http://schemas.openxmlformats.org/markup-compatibility/2006" xmlns:a14="http://schemas.microsoft.com/office/drawing/2010/main">
+          <mc:Choice Requires="a14">
             <p:sp>
               <p:nvSpPr>
                 <p:cNvPr id="93" name="TextBox 92"/>
@@ -7989,6 +7990,7 @@
                 </a:bodyPr>
                 <a:lstStyle/>
                 <a:p>
+                  <a:pPr/>
                   <a14:m>
                     <m:oMathPara xmlns:m="http://schemas.openxmlformats.org/officeDocument/2006/math">
                       <m:oMathParaPr>
@@ -8009,7 +8011,7 @@
               </p:txBody>
             </p:sp>
           </mc:Choice>
-          <mc:Fallback>
+          <mc:Fallback xmlns="">
             <p:sp>
               <p:nvSpPr>
                 <p:cNvPr id="93" name="TextBox 92"/>
@@ -8048,8 +8050,8 @@
             </p:sp>
           </mc:Fallback>
         </mc:AlternateContent>
-        <mc:AlternateContent xmlns:mc="http://schemas.openxmlformats.org/markup-compatibility/2006">
-          <mc:Choice xmlns:a14="http://schemas.microsoft.com/office/drawing/2010/main" Requires="a14">
+        <mc:AlternateContent xmlns:mc="http://schemas.openxmlformats.org/markup-compatibility/2006" xmlns:a14="http://schemas.microsoft.com/office/drawing/2010/main">
+          <mc:Choice Requires="a14">
             <p:sp>
               <p:nvSpPr>
                 <p:cNvPr id="94" name="TextBox 93"/>
@@ -8072,6 +8074,7 @@
                 </a:bodyPr>
                 <a:lstStyle/>
                 <a:p>
+                  <a:pPr/>
                   <a14:m>
                     <m:oMathPara xmlns:m="http://schemas.openxmlformats.org/officeDocument/2006/math">
                       <m:oMathParaPr>
@@ -8092,7 +8095,7 @@
               </p:txBody>
             </p:sp>
           </mc:Choice>
-          <mc:Fallback>
+          <mc:Fallback xmlns="">
             <p:sp>
               <p:nvSpPr>
                 <p:cNvPr id="94" name="TextBox 93"/>
@@ -8176,8 +8179,8 @@
             <a:chExt cx="5247228" cy="3901226"/>
           </a:xfrm>
         </p:grpSpPr>
-        <mc:AlternateContent xmlns:mc="http://schemas.openxmlformats.org/markup-compatibility/2006">
-          <mc:Choice xmlns:a14="http://schemas.microsoft.com/office/drawing/2010/main" Requires="a14">
+        <mc:AlternateContent xmlns:mc="http://schemas.openxmlformats.org/markup-compatibility/2006" xmlns:a14="http://schemas.microsoft.com/office/drawing/2010/main">
+          <mc:Choice Requires="a14">
             <p:sp>
               <p:nvSpPr>
                 <p:cNvPr id="4" name="Parallelogram 3"/>
@@ -8255,7 +8258,7 @@
               </p:txBody>
             </p:sp>
           </mc:Choice>
-          <mc:Fallback>
+          <mc:Fallback xmlns="">
             <p:sp>
               <p:nvSpPr>
                 <p:cNvPr id="4" name="Parallelogram 3"/>
@@ -8296,8 +8299,8 @@
             </p:sp>
           </mc:Fallback>
         </mc:AlternateContent>
-        <mc:AlternateContent xmlns:mc="http://schemas.openxmlformats.org/markup-compatibility/2006">
-          <mc:Choice xmlns:a14="http://schemas.microsoft.com/office/drawing/2010/main" Requires="a14">
+        <mc:AlternateContent xmlns:mc="http://schemas.openxmlformats.org/markup-compatibility/2006" xmlns:a14="http://schemas.microsoft.com/office/drawing/2010/main">
+          <mc:Choice Requires="a14">
             <p:sp>
               <p:nvSpPr>
                 <p:cNvPr id="5" name="Oval 4"/>
@@ -8396,7 +8399,7 @@
               </p:txBody>
             </p:sp>
           </mc:Choice>
-          <mc:Fallback>
+          <mc:Fallback xmlns="">
             <p:sp>
               <p:nvSpPr>
                 <p:cNvPr id="5" name="Oval 4"/>
@@ -8440,8 +8443,8 @@
             </p:sp>
           </mc:Fallback>
         </mc:AlternateContent>
-        <mc:AlternateContent xmlns:mc="http://schemas.openxmlformats.org/markup-compatibility/2006">
-          <mc:Choice xmlns:a14="http://schemas.microsoft.com/office/drawing/2010/main" Requires="a14">
+        <mc:AlternateContent xmlns:mc="http://schemas.openxmlformats.org/markup-compatibility/2006" xmlns:a14="http://schemas.microsoft.com/office/drawing/2010/main">
+          <mc:Choice Requires="a14">
             <p:sp>
               <p:nvSpPr>
                 <p:cNvPr id="6" name="Oval 5"/>
@@ -8519,7 +8522,7 @@
               </p:txBody>
             </p:sp>
           </mc:Choice>
-          <mc:Fallback>
+          <mc:Fallback xmlns="">
             <p:sp>
               <p:nvSpPr>
                 <p:cNvPr id="6" name="Oval 5"/>
@@ -8558,8 +8561,8 @@
             </p:sp>
           </mc:Fallback>
         </mc:AlternateContent>
-        <mc:AlternateContent xmlns:mc="http://schemas.openxmlformats.org/markup-compatibility/2006">
-          <mc:Choice xmlns:a14="http://schemas.microsoft.com/office/drawing/2010/main" Requires="a14">
+        <mc:AlternateContent xmlns:mc="http://schemas.openxmlformats.org/markup-compatibility/2006" xmlns:a14="http://schemas.microsoft.com/office/drawing/2010/main">
+          <mc:Choice Requires="a14">
             <p:sp>
               <p:nvSpPr>
                 <p:cNvPr id="7" name="Oval 6"/>
@@ -8693,7 +8696,7 @@
               </p:txBody>
             </p:sp>
           </mc:Choice>
-          <mc:Fallback>
+          <mc:Fallback xmlns="">
             <p:sp>
               <p:nvSpPr>
                 <p:cNvPr id="7" name="Oval 6"/>
@@ -8737,8 +8740,8 @@
             </p:sp>
           </mc:Fallback>
         </mc:AlternateContent>
-        <mc:AlternateContent xmlns:mc="http://schemas.openxmlformats.org/markup-compatibility/2006">
-          <mc:Choice xmlns:a14="http://schemas.microsoft.com/office/drawing/2010/main" Requires="a14">
+        <mc:AlternateContent xmlns:mc="http://schemas.openxmlformats.org/markup-compatibility/2006" xmlns:a14="http://schemas.microsoft.com/office/drawing/2010/main">
+          <mc:Choice Requires="a14">
             <p:sp>
               <p:nvSpPr>
                 <p:cNvPr id="8" name="Oval 7"/>
@@ -8814,7 +8817,7 @@
               </p:txBody>
             </p:sp>
           </mc:Choice>
-          <mc:Fallback>
+          <mc:Fallback xmlns="">
             <p:sp>
               <p:nvSpPr>
                 <p:cNvPr id="8" name="Oval 7"/>
@@ -9150,8 +9153,8 @@
             </a:fontRef>
           </p:style>
         </p:cxnSp>
-        <mc:AlternateContent xmlns:mc="http://schemas.openxmlformats.org/markup-compatibility/2006">
-          <mc:Choice xmlns:a14="http://schemas.microsoft.com/office/drawing/2010/main" Requires="a14">
+        <mc:AlternateContent xmlns:mc="http://schemas.openxmlformats.org/markup-compatibility/2006" xmlns:a14="http://schemas.microsoft.com/office/drawing/2010/main">
+          <mc:Choice Requires="a14">
             <p:sp>
               <p:nvSpPr>
                 <p:cNvPr id="17" name="Oval 16"/>
@@ -9229,7 +9232,7 @@
               </p:txBody>
             </p:sp>
           </mc:Choice>
-          <mc:Fallback>
+          <mc:Fallback xmlns="">
             <p:sp>
               <p:nvSpPr>
                 <p:cNvPr id="17" name="Oval 16"/>
@@ -9268,8 +9271,8 @@
             </p:sp>
           </mc:Fallback>
         </mc:AlternateContent>
-        <mc:AlternateContent xmlns:mc="http://schemas.openxmlformats.org/markup-compatibility/2006">
-          <mc:Choice xmlns:a14="http://schemas.microsoft.com/office/drawing/2010/main" Requires="a14">
+        <mc:AlternateContent xmlns:mc="http://schemas.openxmlformats.org/markup-compatibility/2006" xmlns:a14="http://schemas.microsoft.com/office/drawing/2010/main">
+          <mc:Choice Requires="a14">
             <p:sp>
               <p:nvSpPr>
                 <p:cNvPr id="18" name="Oval 17"/>
@@ -9328,7 +9331,7 @@
               </p:txBody>
             </p:sp>
           </mc:Choice>
-          <mc:Fallback>
+          <mc:Fallback xmlns="">
             <p:sp>
               <p:nvSpPr>
                 <p:cNvPr id="18" name="Oval 17"/>
@@ -9445,8 +9448,8 @@
             </a:fontRef>
           </p:style>
         </p:cxnSp>
-        <mc:AlternateContent xmlns:mc="http://schemas.openxmlformats.org/markup-compatibility/2006">
-          <mc:Choice xmlns:a14="http://schemas.microsoft.com/office/drawing/2010/main" Requires="a14">
+        <mc:AlternateContent xmlns:mc="http://schemas.openxmlformats.org/markup-compatibility/2006" xmlns:a14="http://schemas.microsoft.com/office/drawing/2010/main">
+          <mc:Choice Requires="a14">
             <p:sp>
               <p:nvSpPr>
                 <p:cNvPr id="21" name="Oval 20"/>
@@ -9524,7 +9527,7 @@
               </p:txBody>
             </p:sp>
           </mc:Choice>
-          <mc:Fallback>
+          <mc:Fallback xmlns="">
             <p:sp>
               <p:nvSpPr>
                 <p:cNvPr id="21" name="Oval 20"/>
@@ -9602,8 +9605,8 @@
             </a:fontRef>
           </p:style>
         </p:cxnSp>
-        <mc:AlternateContent xmlns:mc="http://schemas.openxmlformats.org/markup-compatibility/2006">
-          <mc:Choice xmlns:a14="http://schemas.microsoft.com/office/drawing/2010/main" Requires="a14">
+        <mc:AlternateContent xmlns:mc="http://schemas.openxmlformats.org/markup-compatibility/2006" xmlns:a14="http://schemas.microsoft.com/office/drawing/2010/main">
+          <mc:Choice Requires="a14">
             <p:sp>
               <p:nvSpPr>
                 <p:cNvPr id="27" name="Oval 26"/>
@@ -9681,7 +9684,7 @@
               </p:txBody>
             </p:sp>
           </mc:Choice>
-          <mc:Fallback>
+          <mc:Fallback xmlns="">
             <p:sp>
               <p:nvSpPr>
                 <p:cNvPr id="27" name="Oval 26"/>
@@ -9759,8 +9762,8 @@
             </a:fontRef>
           </p:style>
         </p:cxnSp>
-        <mc:AlternateContent xmlns:mc="http://schemas.openxmlformats.org/markup-compatibility/2006">
-          <mc:Choice xmlns:a14="http://schemas.microsoft.com/office/drawing/2010/main" Requires="a14">
+        <mc:AlternateContent xmlns:mc="http://schemas.openxmlformats.org/markup-compatibility/2006" xmlns:a14="http://schemas.microsoft.com/office/drawing/2010/main">
+          <mc:Choice Requires="a14">
             <p:sp>
               <p:nvSpPr>
                 <p:cNvPr id="31" name="Oval 30"/>
@@ -9838,7 +9841,7 @@
               </p:txBody>
             </p:sp>
           </mc:Choice>
-          <mc:Fallback>
+          <mc:Fallback xmlns="">
             <p:sp>
               <p:nvSpPr>
                 <p:cNvPr id="31" name="Oval 30"/>
@@ -9921,6 +9924,74 @@
     <p:extLst>
       <p:ext uri="{BB962C8B-B14F-4D97-AF65-F5344CB8AC3E}">
         <p14:creationId xmlns:p14="http://schemas.microsoft.com/office/powerpoint/2010/main" val="887552497"/>
+      </p:ext>
+    </p:extLst>
+  </p:cSld>
+  <p:clrMapOvr>
+    <a:masterClrMapping/>
+  </p:clrMapOvr>
+</p:sld>
+</file>
+
+<file path=ppt/slides/slide3.xml><?xml version="1.0" encoding="utf-8"?>
+<p:sld xmlns:a="http://schemas.openxmlformats.org/drawingml/2006/main" xmlns:r="http://schemas.openxmlformats.org/officeDocument/2006/relationships" xmlns:p="http://schemas.openxmlformats.org/presentationml/2006/main">
+  <p:cSld>
+    <p:spTree>
+      <p:nvGrpSpPr>
+        <p:cNvPr id="1" name=""/>
+        <p:cNvGrpSpPr/>
+        <p:nvPr/>
+      </p:nvGrpSpPr>
+      <p:grpSpPr>
+        <a:xfrm>
+          <a:off x="0" y="0"/>
+          <a:ext cx="0" cy="0"/>
+          <a:chOff x="0" y="0"/>
+          <a:chExt cx="0" cy="0"/>
+        </a:xfrm>
+      </p:grpSpPr>
+      <p:sp>
+        <p:nvSpPr>
+          <p:cNvPr id="2" name="Title 1"/>
+          <p:cNvSpPr>
+            <a:spLocks noGrp="1"/>
+          </p:cNvSpPr>
+          <p:nvPr>
+            <p:ph type="title"/>
+          </p:nvPr>
+        </p:nvSpPr>
+        <p:spPr/>
+        <p:txBody>
+          <a:bodyPr/>
+          <a:lstStyle/>
+          <a:p>
+            <a:endParaRPr lang="en-US"/>
+          </a:p>
+        </p:txBody>
+      </p:sp>
+      <p:sp>
+        <p:nvSpPr>
+          <p:cNvPr id="3" name="Content Placeholder 2"/>
+          <p:cNvSpPr>
+            <a:spLocks noGrp="1"/>
+          </p:cNvSpPr>
+          <p:nvPr>
+            <p:ph idx="1"/>
+          </p:nvPr>
+        </p:nvSpPr>
+        <p:spPr/>
+        <p:txBody>
+          <a:bodyPr/>
+          <a:lstStyle/>
+          <a:p>
+            <a:endParaRPr lang="en-US"/>
+          </a:p>
+        </p:txBody>
+      </p:sp>
+    </p:spTree>
+    <p:extLst>
+      <p:ext uri="{BB962C8B-B14F-4D97-AF65-F5344CB8AC3E}">
+        <p14:creationId xmlns:p14="http://schemas.microsoft.com/office/powerpoint/2010/main" val="2187710010"/>
       </p:ext>
     </p:extLst>
   </p:cSld>

</xml_diff>